<commit_message>
apply comments from class
</commit_message>
<xml_diff>
--- a/BTC C02 emissions.pptx
+++ b/BTC C02 emissions.pptx
@@ -8,7 +8,9 @@
     <p:sldId id="256" r:id="rId2"/>
     <p:sldId id="257" r:id="rId3"/>
     <p:sldId id="258" r:id="rId4"/>
-    <p:sldId id="259" r:id="rId5"/>
+    <p:sldId id="261" r:id="rId5"/>
+    <p:sldId id="259" r:id="rId6"/>
+    <p:sldId id="262" r:id="rId7"/>
   </p:sldIdLst>
   <p:sldSz cx="12192000" cy="6858000"/>
   <p:notesSz cx="6858000" cy="9144000"/>
@@ -107,6 +109,11 @@
       </a:defRPr>
     </a:lvl9pPr>
   </p:defaultTextStyle>
+  <p:extLst>
+    <p:ext uri="{EFAFB233-063F-42B5-8137-9DF3F51BA10A}">
+      <p15:sldGuideLst xmlns:p15="http://schemas.microsoft.com/office/powerpoint/2012/main"/>
+    </p:ext>
+  </p:extLst>
 </p:presentation>
 </file>
 
@@ -278,7 +285,7 @@
           <a:p>
             <a:fld id="{2F4C9470-4500-4EEF-AB7C-7647D092420E}" type="datetimeFigureOut">
               <a:rPr lang="en-GB" smtClean="0"/>
-              <a:t>01/03/2023</a:t>
+              <a:t>03/03/2023</a:t>
             </a:fld>
             <a:endParaRPr lang="en-GB"/>
           </a:p>
@@ -506,7 +513,7 @@
           <a:p>
             <a:fld id="{2F4C9470-4500-4EEF-AB7C-7647D092420E}" type="datetimeFigureOut">
               <a:rPr lang="en-GB" smtClean="0"/>
-              <a:t>01/03/2023</a:t>
+              <a:t>03/03/2023</a:t>
             </a:fld>
             <a:endParaRPr lang="en-GB"/>
           </a:p>
@@ -686,7 +693,7 @@
           <a:p>
             <a:fld id="{2F4C9470-4500-4EEF-AB7C-7647D092420E}" type="datetimeFigureOut">
               <a:rPr lang="en-GB" smtClean="0"/>
-              <a:t>01/03/2023</a:t>
+              <a:t>03/03/2023</a:t>
             </a:fld>
             <a:endParaRPr lang="en-GB"/>
           </a:p>
@@ -856,7 +863,7 @@
           <a:p>
             <a:fld id="{2F4C9470-4500-4EEF-AB7C-7647D092420E}" type="datetimeFigureOut">
               <a:rPr lang="en-GB" smtClean="0"/>
-              <a:t>01/03/2023</a:t>
+              <a:t>03/03/2023</a:t>
             </a:fld>
             <a:endParaRPr lang="en-GB"/>
           </a:p>
@@ -1110,7 +1117,7 @@
           <a:p>
             <a:fld id="{2F4C9470-4500-4EEF-AB7C-7647D092420E}" type="datetimeFigureOut">
               <a:rPr lang="en-GB" smtClean="0"/>
-              <a:t>01/03/2023</a:t>
+              <a:t>03/03/2023</a:t>
             </a:fld>
             <a:endParaRPr lang="en-GB"/>
           </a:p>
@@ -1436,7 +1443,7 @@
           <a:p>
             <a:fld id="{2F4C9470-4500-4EEF-AB7C-7647D092420E}" type="datetimeFigureOut">
               <a:rPr lang="en-GB" smtClean="0"/>
-              <a:t>01/03/2023</a:t>
+              <a:t>03/03/2023</a:t>
             </a:fld>
             <a:endParaRPr lang="en-GB"/>
           </a:p>
@@ -1887,7 +1894,7 @@
           <a:p>
             <a:fld id="{2F4C9470-4500-4EEF-AB7C-7647D092420E}" type="datetimeFigureOut">
               <a:rPr lang="en-GB" smtClean="0"/>
-              <a:t>01/03/2023</a:t>
+              <a:t>03/03/2023</a:t>
             </a:fld>
             <a:endParaRPr lang="en-GB"/>
           </a:p>
@@ -2005,7 +2012,7 @@
           <a:p>
             <a:fld id="{2F4C9470-4500-4EEF-AB7C-7647D092420E}" type="datetimeFigureOut">
               <a:rPr lang="en-GB" smtClean="0"/>
-              <a:t>01/03/2023</a:t>
+              <a:t>03/03/2023</a:t>
             </a:fld>
             <a:endParaRPr lang="en-GB"/>
           </a:p>
@@ -2100,7 +2107,7 @@
           <a:p>
             <a:fld id="{2F4C9470-4500-4EEF-AB7C-7647D092420E}" type="datetimeFigureOut">
               <a:rPr lang="en-GB" smtClean="0"/>
-              <a:t>01/03/2023</a:t>
+              <a:t>03/03/2023</a:t>
             </a:fld>
             <a:endParaRPr lang="en-GB"/>
           </a:p>
@@ -2387,7 +2394,7 @@
           <a:p>
             <a:fld id="{2F4C9470-4500-4EEF-AB7C-7647D092420E}" type="datetimeFigureOut">
               <a:rPr lang="en-GB" smtClean="0"/>
-              <a:t>01/03/2023</a:t>
+              <a:t>03/03/2023</a:t>
             </a:fld>
             <a:endParaRPr lang="en-GB"/>
           </a:p>
@@ -2709,7 +2716,7 @@
           <a:p>
             <a:fld id="{2F4C9470-4500-4EEF-AB7C-7647D092420E}" type="datetimeFigureOut">
               <a:rPr lang="en-GB" smtClean="0"/>
-              <a:t>01/03/2023</a:t>
+              <a:t>03/03/2023</a:t>
             </a:fld>
             <a:endParaRPr lang="en-GB"/>
           </a:p>
@@ -2963,7 +2970,7 @@
           <a:p>
             <a:fld id="{2F4C9470-4500-4EEF-AB7C-7647D092420E}" type="datetimeFigureOut">
               <a:rPr lang="en-GB" smtClean="0"/>
-              <a:t>01/03/2023</a:t>
+              <a:t>03/03/2023</a:t>
             </a:fld>
             <a:endParaRPr lang="en-GB"/>
           </a:p>
@@ -3735,6 +3742,41 @@
           <a:chExt cx="0" cy="0"/>
         </a:xfrm>
       </p:grpSpPr>
+      <p:pic>
+        <p:nvPicPr>
+          <p:cNvPr id="4" name="Picture 3" descr="Chart, histogram, scatter chart&#10;&#10;Description automatically generated">
+            <a:extLst>
+              <a:ext uri="{FF2B5EF4-FFF2-40B4-BE49-F238E27FC236}">
+                <a16:creationId xmlns:a16="http://schemas.microsoft.com/office/drawing/2014/main" id="{C12D93C1-90B0-A83A-2EDA-3665055C6133}"/>
+              </a:ext>
+            </a:extLst>
+          </p:cNvPr>
+          <p:cNvPicPr>
+            <a:picLocks noChangeAspect="1"/>
+          </p:cNvPicPr>
+          <p:nvPr/>
+        </p:nvPicPr>
+        <p:blipFill rotWithShape="1">
+          <a:blip r:embed="rId2">
+            <a:extLst>
+              <a:ext uri="{28A0092B-C50C-407E-A947-70E740481C1C}">
+                <a14:useLocalDpi xmlns:a14="http://schemas.microsoft.com/office/drawing/2010/main" val="0"/>
+              </a:ext>
+            </a:extLst>
+          </a:blip>
+          <a:srcRect l="8715" r="8171"/>
+          <a:stretch/>
+        </p:blipFill>
+        <p:spPr>
+          <a:xfrm>
+            <a:off x="404584" y="2698063"/>
+            <a:ext cx="10133351" cy="4064000"/>
+          </a:xfrm>
+          <a:prstGeom prst="rect">
+            <a:avLst/>
+          </a:prstGeom>
+        </p:spPr>
+      </p:pic>
       <p:sp>
         <p:nvSpPr>
           <p:cNvPr id="2" name="Title 1">
@@ -3753,12 +3795,31 @@
         </p:nvSpPr>
         <p:spPr/>
         <p:txBody>
-          <a:bodyPr/>
+          <a:bodyPr>
+            <a:normAutofit/>
+          </a:bodyPr>
           <a:lstStyle/>
           <a:p>
             <a:r>
               <a:rPr lang="en-GB" dirty="0" err="1"/>
               <a:t>Resultados</a:t>
+            </a:r>
+            <a:r>
+              <a:rPr lang="en-GB" dirty="0"/>
+              <a:t> desde </a:t>
+            </a:r>
+            <a:br>
+              <a:rPr lang="en-GB" dirty="0"/>
+            </a:br>
+            <a:r>
+              <a:rPr lang="en-GB" b="0" dirty="0">
+                <a:solidFill>
+                  <a:srgbClr val="CE9178"/>
+                </a:solidFill>
+                <a:effectLst/>
+                <a:latin typeface="Consolas" panose="020B0609020204030204" pitchFamily="49" charset="0"/>
+              </a:rPr>
+              <a:t>BTCEMI_MAX</a:t>
             </a:r>
             <a:endParaRPr lang="en-GB" dirty="0"/>
           </a:p>
@@ -3779,51 +3840,15 @@
           <p:nvPr/>
         </p:nvPicPr>
         <p:blipFill>
-          <a:blip r:embed="rId2"/>
+          <a:blip r:embed="rId3"/>
           <a:stretch>
             <a:fillRect/>
           </a:stretch>
         </p:blipFill>
         <p:spPr>
           <a:xfrm>
-            <a:off x="815639" y="2454447"/>
+            <a:off x="6108192" y="95937"/>
             <a:ext cx="4429743" cy="2743583"/>
-          </a:xfrm>
-          <a:prstGeom prst="rect">
-            <a:avLst/>
-          </a:prstGeom>
-        </p:spPr>
-      </p:pic>
-      <p:pic>
-        <p:nvPicPr>
-          <p:cNvPr id="7" name="Picture 6" descr="Chart, histogram&#10;&#10;Description automatically generated">
-            <a:extLst>
-              <a:ext uri="{FF2B5EF4-FFF2-40B4-BE49-F238E27FC236}">
-                <a16:creationId xmlns:a16="http://schemas.microsoft.com/office/drawing/2014/main" id="{9B8333F7-14F9-4B81-5768-BB05CB2349A1}"/>
-              </a:ext>
-            </a:extLst>
-          </p:cNvPr>
-          <p:cNvPicPr>
-            <a:picLocks noChangeAspect="1"/>
-          </p:cNvPicPr>
-          <p:nvPr/>
-        </p:nvPicPr>
-        <p:blipFill>
-          <a:blip r:embed="rId3">
-            <a:extLst>
-              <a:ext uri="{28A0092B-C50C-407E-A947-70E740481C1C}">
-                <a14:useLocalDpi xmlns:a14="http://schemas.microsoft.com/office/drawing/2010/main" val="0"/>
-              </a:ext>
-            </a:extLst>
-          </a:blip>
-          <a:stretch>
-            <a:fillRect/>
-          </a:stretch>
-        </p:blipFill>
-        <p:spPr>
-          <a:xfrm>
-            <a:off x="5891655" y="0"/>
-            <a:ext cx="5385424" cy="6858000"/>
           </a:xfrm>
           <a:prstGeom prst="rect">
             <a:avLst/>
@@ -3865,6 +3890,149 @@
           <p:cNvPr id="2" name="Title 1">
             <a:extLst>
               <a:ext uri="{FF2B5EF4-FFF2-40B4-BE49-F238E27FC236}">
+                <a16:creationId xmlns:a16="http://schemas.microsoft.com/office/drawing/2014/main" id="{8D435D8A-8AF7-DC45-E984-DCB7968710C7}"/>
+              </a:ext>
+            </a:extLst>
+          </p:cNvPr>
+          <p:cNvSpPr>
+            <a:spLocks noGrp="1"/>
+          </p:cNvSpPr>
+          <p:nvPr>
+            <p:ph type="title"/>
+          </p:nvPr>
+        </p:nvSpPr>
+        <p:spPr/>
+        <p:txBody>
+          <a:bodyPr>
+            <a:normAutofit/>
+          </a:bodyPr>
+          <a:lstStyle/>
+          <a:p>
+            <a:r>
+              <a:rPr lang="en-GB" dirty="0" err="1"/>
+              <a:t>Resultados</a:t>
+            </a:r>
+            <a:r>
+              <a:rPr lang="en-GB" dirty="0"/>
+              <a:t> desde </a:t>
+            </a:r>
+            <a:br>
+              <a:rPr lang="en-GB" dirty="0"/>
+            </a:br>
+            <a:r>
+              <a:rPr lang="en-GB" b="0" dirty="0">
+                <a:solidFill>
+                  <a:srgbClr val="CE9178"/>
+                </a:solidFill>
+                <a:effectLst/>
+                <a:latin typeface="Consolas" panose="020B0609020204030204" pitchFamily="49" charset="0"/>
+              </a:rPr>
+              <a:t>BTCOAL_MAX</a:t>
+            </a:r>
+            <a:endParaRPr lang="en-GB" dirty="0"/>
+          </a:p>
+        </p:txBody>
+      </p:sp>
+      <p:pic>
+        <p:nvPicPr>
+          <p:cNvPr id="6" name="Picture 5">
+            <a:extLst>
+              <a:ext uri="{FF2B5EF4-FFF2-40B4-BE49-F238E27FC236}">
+                <a16:creationId xmlns:a16="http://schemas.microsoft.com/office/drawing/2014/main" id="{8167FF20-5E72-D377-A3E6-980DA8340E0E}"/>
+              </a:ext>
+            </a:extLst>
+          </p:cNvPr>
+          <p:cNvPicPr>
+            <a:picLocks noChangeAspect="1"/>
+          </p:cNvPicPr>
+          <p:nvPr/>
+        </p:nvPicPr>
+        <p:blipFill>
+          <a:blip r:embed="rId2"/>
+          <a:stretch>
+            <a:fillRect/>
+          </a:stretch>
+        </p:blipFill>
+        <p:spPr>
+          <a:xfrm>
+            <a:off x="6623146" y="225456"/>
+            <a:ext cx="4534533" cy="2676899"/>
+          </a:xfrm>
+          <a:prstGeom prst="rect">
+            <a:avLst/>
+          </a:prstGeom>
+        </p:spPr>
+      </p:pic>
+      <p:pic>
+        <p:nvPicPr>
+          <p:cNvPr id="8" name="Picture 7" descr="Chart, histogram, scatter chart&#10;&#10;Description automatically generated">
+            <a:extLst>
+              <a:ext uri="{FF2B5EF4-FFF2-40B4-BE49-F238E27FC236}">
+                <a16:creationId xmlns:a16="http://schemas.microsoft.com/office/drawing/2014/main" id="{7685902D-DD56-63D6-F7BB-EBFAE6FFDEC5}"/>
+              </a:ext>
+            </a:extLst>
+          </p:cNvPr>
+          <p:cNvPicPr>
+            <a:picLocks noChangeAspect="1"/>
+          </p:cNvPicPr>
+          <p:nvPr/>
+        </p:nvPicPr>
+        <p:blipFill rotWithShape="1">
+          <a:blip r:embed="rId3">
+            <a:extLst>
+              <a:ext uri="{28A0092B-C50C-407E-A947-70E740481C1C}">
+                <a14:useLocalDpi xmlns:a14="http://schemas.microsoft.com/office/drawing/2010/main" val="0"/>
+              </a:ext>
+            </a:extLst>
+          </a:blip>
+          <a:srcRect l="7341" r="7747"/>
+          <a:stretch/>
+        </p:blipFill>
+        <p:spPr>
+          <a:xfrm>
+            <a:off x="837948" y="2970550"/>
+            <a:ext cx="9692641" cy="3805003"/>
+          </a:xfrm>
+          <a:prstGeom prst="rect">
+            <a:avLst/>
+          </a:prstGeom>
+        </p:spPr>
+      </p:pic>
+    </p:spTree>
+    <p:extLst>
+      <p:ext uri="{BB962C8B-B14F-4D97-AF65-F5344CB8AC3E}">
+        <p14:creationId xmlns:p14="http://schemas.microsoft.com/office/powerpoint/2010/main" val="1251657607"/>
+      </p:ext>
+    </p:extLst>
+  </p:cSld>
+  <p:clrMapOvr>
+    <a:masterClrMapping/>
+  </p:clrMapOvr>
+</p:sld>
+</file>
+
+<file path=ppt/slides/slide5.xml><?xml version="1.0" encoding="utf-8"?>
+<p:sld xmlns:a="http://schemas.openxmlformats.org/drawingml/2006/main" xmlns:r="http://schemas.openxmlformats.org/officeDocument/2006/relationships" xmlns:p="http://schemas.openxmlformats.org/presentationml/2006/main">
+  <p:cSld>
+    <p:spTree>
+      <p:nvGrpSpPr>
+        <p:cNvPr id="1" name=""/>
+        <p:cNvGrpSpPr/>
+        <p:nvPr/>
+      </p:nvGrpSpPr>
+      <p:grpSpPr>
+        <a:xfrm>
+          <a:off x="0" y="0"/>
+          <a:ext cx="0" cy="0"/>
+          <a:chOff x="0" y="0"/>
+          <a:chExt cx="0" cy="0"/>
+        </a:xfrm>
+      </p:grpSpPr>
+      <p:sp>
+        <p:nvSpPr>
+          <p:cNvPr id="2" name="Title 1">
+            <a:extLst>
+              <a:ext uri="{FF2B5EF4-FFF2-40B4-BE49-F238E27FC236}">
                 <a16:creationId xmlns:a16="http://schemas.microsoft.com/office/drawing/2014/main" id="{1A9C5903-F2DF-D4E6-5506-64066D99387B}"/>
               </a:ext>
             </a:extLst>
@@ -3884,6 +4052,20 @@
             <a:r>
               <a:rPr lang="en-US" dirty="0" err="1"/>
               <a:t>Observaciones</a:t>
+            </a:r>
+            <a:r>
+              <a:rPr lang="en-US" dirty="0"/>
+              <a:t> </a:t>
+            </a:r>
+            <a:r>
+              <a:rPr lang="en-GB" b="0" dirty="0">
+                <a:solidFill>
+                  <a:srgbClr val="CE9178"/>
+                </a:solidFill>
+                <a:effectLst/>
+                <a:latin typeface="Consolas" panose="020B0609020204030204" pitchFamily="49" charset="0"/>
+              </a:rPr>
+              <a:t>BTCEMI_MAX</a:t>
             </a:r>
             <a:r>
               <a:rPr lang="en-US" dirty="0"/>
@@ -3912,7 +4094,12 @@
             <p:ph idx="1"/>
           </p:nvPr>
         </p:nvSpPr>
-        <p:spPr/>
+        <p:spPr>
+          <a:xfrm>
+            <a:off x="1261872" y="1349115"/>
+            <a:ext cx="8595360" cy="5508885"/>
+          </a:xfrm>
+        </p:spPr>
         <p:txBody>
           <a:bodyPr>
             <a:normAutofit lnSpcReduction="10000"/>
@@ -3923,599 +4110,60 @@
               <a:buNone/>
             </a:pPr>
             <a:r>
-              <a:rPr lang="en-US" dirty="0"/>
-              <a:t>La “</a:t>
-            </a:r>
-            <a:r>
-              <a:rPr lang="en-US" dirty="0" err="1"/>
-              <a:t>función</a:t>
-            </a:r>
-            <a:r>
-              <a:rPr lang="en-US" dirty="0"/>
-              <a:t>” </a:t>
-            </a:r>
-            <a:r>
-              <a:rPr lang="en-US" dirty="0" err="1"/>
-              <a:t>aparenta</a:t>
-            </a:r>
-            <a:r>
-              <a:rPr lang="en-US" dirty="0"/>
-              <a:t> </a:t>
-            </a:r>
-            <a:r>
-              <a:rPr lang="en-US" dirty="0" err="1"/>
-              <a:t>tener</a:t>
-            </a:r>
-            <a:r>
-              <a:rPr lang="en-US" dirty="0"/>
-              <a:t> un </a:t>
-            </a:r>
-            <a:r>
-              <a:rPr lang="en-US" dirty="0" err="1"/>
-              <a:t>crecimiento</a:t>
-            </a:r>
-            <a:r>
-              <a:rPr lang="en-US" dirty="0"/>
-              <a:t> </a:t>
-            </a:r>
-            <a:r>
-              <a:rPr lang="en-US" dirty="0" err="1"/>
-              <a:t>exponencial</a:t>
-            </a:r>
-            <a:r>
-              <a:rPr lang="en-US" dirty="0"/>
-              <a:t>, </a:t>
-            </a:r>
-            <a:r>
-              <a:rPr lang="en-US" i="1" dirty="0"/>
+              <a:rPr lang="es-MX" dirty="0"/>
+              <a:t>Los datos aparenta tener un crecimiento </a:t>
+            </a:r>
+            <a:r>
+              <a:rPr lang="es-MX" i="1" dirty="0"/>
               <a:t>ad hoc </a:t>
             </a:r>
             <a:r>
-              <a:rPr lang="en-US" dirty="0"/>
-              <a:t>con </a:t>
-            </a:r>
-            <a:r>
-              <a:rPr lang="en-US" dirty="0" err="1"/>
-              <a:t>el</a:t>
-            </a:r>
-            <a:r>
-              <a:rPr lang="en-US" dirty="0"/>
-              <a:t> </a:t>
-            </a:r>
-            <a:r>
-              <a:rPr lang="en-US" dirty="0" err="1"/>
-              <a:t>comportamiento</a:t>
-            </a:r>
-            <a:r>
-              <a:rPr lang="en-US" dirty="0"/>
-              <a:t> de </a:t>
-            </a:r>
-            <a:r>
-              <a:rPr lang="en-US" dirty="0" err="1"/>
-              <a:t>estas</a:t>
-            </a:r>
-            <a:r>
-              <a:rPr lang="en-US" dirty="0"/>
-              <a:t> </a:t>
-            </a:r>
-            <a:r>
-              <a:rPr lang="en-US" dirty="0" err="1"/>
-              <a:t>tecnologías</a:t>
-            </a:r>
-            <a:r>
-              <a:rPr lang="en-US" dirty="0"/>
-              <a:t>.</a:t>
-            </a:r>
-          </a:p>
-          <a:p>
-            <a:r>
-              <a:rPr lang="en-US" dirty="0"/>
-              <a:t>Media: La media </a:t>
-            </a:r>
-            <a:r>
-              <a:rPr lang="en-US" dirty="0" err="1"/>
-              <a:t>esta</a:t>
-            </a:r>
-            <a:r>
-              <a:rPr lang="en-US" dirty="0"/>
-              <a:t> </a:t>
-            </a:r>
-            <a:r>
-              <a:rPr lang="en-US" dirty="0" err="1"/>
-              <a:t>muy</a:t>
-            </a:r>
-            <a:r>
-              <a:rPr lang="en-US" dirty="0"/>
-              <a:t> </a:t>
-            </a:r>
-            <a:r>
-              <a:rPr lang="en-US" dirty="0" err="1"/>
-              <a:t>sesgada</a:t>
-            </a:r>
-            <a:r>
-              <a:rPr lang="en-US" dirty="0"/>
-              <a:t> </a:t>
-            </a:r>
-            <a:r>
-              <a:rPr lang="en-US" dirty="0" err="1"/>
-              <a:t>en</a:t>
-            </a:r>
-            <a:r>
-              <a:rPr lang="en-US" dirty="0"/>
-              <a:t> </a:t>
-            </a:r>
-            <a:r>
-              <a:rPr lang="en-US" dirty="0" err="1"/>
-              <a:t>comparación</a:t>
-            </a:r>
-            <a:r>
-              <a:rPr lang="en-US" dirty="0"/>
-              <a:t> con </a:t>
-            </a:r>
-            <a:r>
-              <a:rPr lang="en-US" dirty="0" err="1"/>
-              <a:t>los</a:t>
-            </a:r>
-            <a:r>
-              <a:rPr lang="en-US" dirty="0"/>
-              <a:t> </a:t>
-            </a:r>
-            <a:r>
-              <a:rPr lang="en-US" dirty="0" err="1"/>
-              <a:t>valores</a:t>
-            </a:r>
-            <a:r>
-              <a:rPr lang="en-US" dirty="0"/>
-              <a:t> </a:t>
-            </a:r>
-            <a:r>
-              <a:rPr lang="en-US" dirty="0" err="1"/>
+              <a:rPr lang="es-MX" dirty="0"/>
+              <a:t>con el comportamiento de estas tecnologías.</a:t>
+            </a:r>
+          </a:p>
+          <a:p>
+            <a:r>
+              <a:rPr lang="es-MX" dirty="0"/>
+              <a:t>Histograma: El histograma claramente indica que esta sesgado a la izquierda.</a:t>
+            </a:r>
+          </a:p>
+          <a:p>
+            <a:r>
+              <a:rPr lang="es-MX" dirty="0"/>
+              <a:t>Media: La media esta muy sesgada en comparación con los valores </a:t>
+            </a:r>
+            <a:r>
+              <a:rPr lang="es-MX" dirty="0" err="1"/>
               <a:t>minimos</a:t>
             </a:r>
             <a:r>
-              <a:rPr lang="en-US" dirty="0"/>
-              <a:t> y </a:t>
-            </a:r>
-            <a:r>
-              <a:rPr lang="en-US" dirty="0" err="1"/>
-              <a:t>maximos</a:t>
-            </a:r>
-            <a:r>
-              <a:rPr lang="en-US" dirty="0"/>
-              <a:t>, </a:t>
-            </a:r>
-            <a:r>
-              <a:rPr lang="en-US" dirty="0" err="1"/>
-              <a:t>puesto</a:t>
-            </a:r>
-            <a:r>
-              <a:rPr lang="en-US" dirty="0"/>
-              <a:t> que </a:t>
-            </a:r>
-            <a:r>
-              <a:rPr lang="en-US" dirty="0" err="1"/>
-              <a:t>tienen</a:t>
-            </a:r>
-            <a:r>
-              <a:rPr lang="en-US" dirty="0"/>
-              <a:t> </a:t>
-            </a:r>
-            <a:r>
-              <a:rPr lang="en-US" dirty="0" err="1"/>
-              <a:t>una</a:t>
-            </a:r>
-            <a:r>
-              <a:rPr lang="en-US" dirty="0"/>
-              <a:t> </a:t>
-            </a:r>
-            <a:r>
-              <a:rPr lang="en-US" dirty="0" err="1"/>
-              <a:t>diferencia</a:t>
-            </a:r>
-            <a:r>
-              <a:rPr lang="en-US" dirty="0"/>
-              <a:t> de </a:t>
-            </a:r>
-            <a:r>
-              <a:rPr lang="en-US" dirty="0" err="1"/>
-              <a:t>varios</a:t>
-            </a:r>
-            <a:r>
-              <a:rPr lang="en-US" dirty="0"/>
-              <a:t> </a:t>
-            </a:r>
-            <a:r>
-              <a:rPr lang="en-US" dirty="0" err="1"/>
-              <a:t>ordenes</a:t>
-            </a:r>
-            <a:r>
-              <a:rPr lang="en-US" dirty="0"/>
-              <a:t> de magnitude </a:t>
-            </a:r>
-            <a:r>
-              <a:rPr lang="en-US" dirty="0" err="1"/>
-              <a:t>diferente</a:t>
-            </a:r>
-            <a:endParaRPr lang="en-US" dirty="0"/>
-          </a:p>
-          <a:p>
-            <a:r>
-              <a:rPr lang="en-US" dirty="0" err="1"/>
-              <a:t>Moda</a:t>
-            </a:r>
-            <a:r>
-              <a:rPr lang="en-US" dirty="0"/>
-              <a:t>: El valor que </a:t>
-            </a:r>
-            <a:r>
-              <a:rPr lang="en-US" dirty="0" err="1"/>
-              <a:t>más</a:t>
-            </a:r>
-            <a:r>
-              <a:rPr lang="en-US" dirty="0"/>
-              <a:t> se </a:t>
-            </a:r>
-            <a:r>
-              <a:rPr lang="en-US" dirty="0" err="1"/>
-              <a:t>repite</a:t>
-            </a:r>
-            <a:r>
-              <a:rPr lang="en-US" dirty="0"/>
-              <a:t>, </a:t>
-            </a:r>
-            <a:r>
-              <a:rPr lang="en-US" dirty="0" err="1"/>
-              <a:t>en</a:t>
-            </a:r>
-            <a:r>
-              <a:rPr lang="en-US" dirty="0"/>
-              <a:t> </a:t>
-            </a:r>
-            <a:r>
-              <a:rPr lang="en-US" dirty="0" err="1"/>
-              <a:t>este</a:t>
-            </a:r>
-            <a:r>
-              <a:rPr lang="en-US" dirty="0"/>
-              <a:t> </a:t>
-            </a:r>
-            <a:r>
-              <a:rPr lang="en-US" dirty="0" err="1"/>
-              <a:t>caso</a:t>
-            </a:r>
-            <a:r>
-              <a:rPr lang="en-US" dirty="0"/>
-              <a:t> </a:t>
-            </a:r>
-            <a:r>
-              <a:rPr lang="en-US" dirty="0" err="1"/>
-              <a:t>probablemente</a:t>
-            </a:r>
-            <a:r>
-              <a:rPr lang="en-US" dirty="0"/>
-              <a:t> </a:t>
-            </a:r>
-            <a:r>
-              <a:rPr lang="en-US" dirty="0" err="1"/>
-              <a:t>por</a:t>
-            </a:r>
-            <a:r>
-              <a:rPr lang="en-US" dirty="0"/>
-              <a:t> un </a:t>
-            </a:r>
-            <a:r>
-              <a:rPr lang="en-US" dirty="0" err="1"/>
-              <a:t>estimado</a:t>
-            </a:r>
-            <a:r>
-              <a:rPr lang="en-US" dirty="0"/>
-              <a:t> </a:t>
-            </a:r>
-            <a:r>
-              <a:rPr lang="en-US" dirty="0" err="1"/>
-              <a:t>númerico</a:t>
-            </a:r>
-            <a:r>
-              <a:rPr lang="en-US" dirty="0"/>
-              <a:t> de </a:t>
-            </a:r>
-            <a:r>
-              <a:rPr lang="en-US" dirty="0" err="1"/>
-              <a:t>operaciones</a:t>
-            </a:r>
-            <a:r>
-              <a:rPr lang="en-US" dirty="0"/>
-              <a:t> vs </a:t>
-            </a:r>
-            <a:r>
-              <a:rPr lang="en-US" dirty="0" err="1"/>
-              <a:t>monedas</a:t>
-            </a:r>
-            <a:r>
-              <a:rPr lang="en-US" dirty="0"/>
-              <a:t>.</a:t>
-            </a:r>
-          </a:p>
-          <a:p>
-            <a:r>
-              <a:rPr lang="en-US" dirty="0" err="1"/>
-              <a:t>Mediana</a:t>
-            </a:r>
-            <a:r>
-              <a:rPr lang="en-US" dirty="0"/>
-              <a:t>: Nos </a:t>
-            </a:r>
-            <a:r>
-              <a:rPr lang="en-US" dirty="0" err="1"/>
-              <a:t>permite</a:t>
-            </a:r>
-            <a:r>
-              <a:rPr lang="en-US" dirty="0"/>
-              <a:t> </a:t>
-            </a:r>
-            <a:r>
-              <a:rPr lang="en-US" dirty="0" err="1"/>
-              <a:t>aproximar</a:t>
-            </a:r>
-            <a:r>
-              <a:rPr lang="en-US" dirty="0"/>
-              <a:t> </a:t>
-            </a:r>
-            <a:r>
-              <a:rPr lang="en-US" dirty="0" err="1"/>
-              <a:t>el</a:t>
-            </a:r>
-            <a:r>
-              <a:rPr lang="en-US" dirty="0"/>
-              <a:t> valor del punto medio </a:t>
-            </a:r>
-            <a:r>
-              <a:rPr lang="en-US" dirty="0" err="1"/>
-              <a:t>si</a:t>
-            </a:r>
-            <a:r>
-              <a:rPr lang="en-US" dirty="0"/>
-              <a:t> </a:t>
-            </a:r>
-            <a:r>
-              <a:rPr lang="en-US" dirty="0" err="1"/>
-              <a:t>los</a:t>
-            </a:r>
-            <a:r>
-              <a:rPr lang="en-US" dirty="0"/>
-              <a:t> </a:t>
-            </a:r>
-            <a:r>
-              <a:rPr lang="en-US" dirty="0" err="1"/>
-              <a:t>valores</a:t>
-            </a:r>
-            <a:r>
-              <a:rPr lang="en-US" dirty="0"/>
-              <a:t> no </a:t>
-            </a:r>
-            <a:r>
-              <a:rPr lang="en-US" dirty="0" err="1"/>
-              <a:t>hubieran</a:t>
-            </a:r>
-            <a:r>
-              <a:rPr lang="en-US" dirty="0"/>
-              <a:t> </a:t>
-            </a:r>
-            <a:r>
-              <a:rPr lang="en-US" dirty="0" err="1"/>
-              <a:t>sido</a:t>
-            </a:r>
-            <a:r>
-              <a:rPr lang="en-US" dirty="0"/>
-              <a:t> </a:t>
-            </a:r>
-            <a:r>
-              <a:rPr lang="en-US" dirty="0" err="1"/>
-              <a:t>ordenados</a:t>
-            </a:r>
-            <a:r>
-              <a:rPr lang="en-US" dirty="0"/>
-              <a:t>.</a:t>
-            </a:r>
-          </a:p>
-          <a:p>
-            <a:r>
-              <a:rPr lang="en-US" dirty="0" err="1"/>
-              <a:t>Varianza</a:t>
-            </a:r>
-            <a:r>
-              <a:rPr lang="en-US" dirty="0"/>
-              <a:t>: La </a:t>
-            </a:r>
-            <a:r>
-              <a:rPr lang="en-US" dirty="0" err="1"/>
-              <a:t>varianza</a:t>
-            </a:r>
-            <a:r>
-              <a:rPr lang="en-US" dirty="0"/>
-              <a:t> es </a:t>
-            </a:r>
-            <a:r>
-              <a:rPr lang="en-US" dirty="0" err="1"/>
-              <a:t>alta</a:t>
-            </a:r>
-            <a:r>
-              <a:rPr lang="en-US" dirty="0"/>
-              <a:t>, </a:t>
-            </a:r>
-            <a:r>
-              <a:rPr lang="en-US" dirty="0" err="1"/>
-              <a:t>puesto</a:t>
-            </a:r>
-            <a:r>
-              <a:rPr lang="en-US" dirty="0"/>
-              <a:t> que </a:t>
-            </a:r>
-            <a:r>
-              <a:rPr lang="en-US" dirty="0" err="1"/>
-              <a:t>en</a:t>
-            </a:r>
-            <a:r>
-              <a:rPr lang="en-US" dirty="0"/>
-              <a:t> </a:t>
-            </a:r>
-            <a:r>
-              <a:rPr lang="en-US" dirty="0" err="1"/>
-              <a:t>este</a:t>
-            </a:r>
-            <a:r>
-              <a:rPr lang="en-US" dirty="0"/>
-              <a:t> </a:t>
-            </a:r>
-            <a:r>
-              <a:rPr lang="en-US" dirty="0" err="1"/>
-              <a:t>rango</a:t>
-            </a:r>
-            <a:r>
-              <a:rPr lang="en-US" dirty="0"/>
-              <a:t> la </a:t>
-            </a:r>
-            <a:r>
-              <a:rPr lang="en-US" dirty="0" err="1"/>
-              <a:t>función</a:t>
-            </a:r>
-            <a:r>
-              <a:rPr lang="en-US" dirty="0"/>
-              <a:t> se </a:t>
-            </a:r>
-            <a:r>
-              <a:rPr lang="en-US" dirty="0" err="1"/>
-              <a:t>comporta</a:t>
-            </a:r>
-            <a:r>
-              <a:rPr lang="en-US" dirty="0"/>
-              <a:t> </a:t>
-            </a:r>
-            <a:r>
-              <a:rPr lang="en-US" dirty="0" err="1"/>
-              <a:t>exponencialmente</a:t>
-            </a:r>
-            <a:r>
-              <a:rPr lang="en-US" dirty="0"/>
-              <a:t>.</a:t>
-            </a:r>
-          </a:p>
-          <a:p>
-            <a:r>
-              <a:rPr lang="en-US" dirty="0"/>
-              <a:t>Rango: El </a:t>
-            </a:r>
-            <a:r>
-              <a:rPr lang="en-US" dirty="0" err="1"/>
-              <a:t>rango</a:t>
-            </a:r>
-            <a:r>
-              <a:rPr lang="en-US" dirty="0"/>
-              <a:t> </a:t>
-            </a:r>
-            <a:r>
-              <a:rPr lang="en-US" dirty="0" err="1"/>
-              <a:t>cubre</a:t>
-            </a:r>
-            <a:r>
-              <a:rPr lang="en-US" dirty="0"/>
-              <a:t> </a:t>
-            </a:r>
-            <a:r>
-              <a:rPr lang="en-US" dirty="0" err="1"/>
-              <a:t>escencialmente</a:t>
-            </a:r>
-            <a:r>
-              <a:rPr lang="en-US" dirty="0"/>
-              <a:t> todos </a:t>
-            </a:r>
-            <a:r>
-              <a:rPr lang="en-US" dirty="0" err="1"/>
-              <a:t>los</a:t>
-            </a:r>
-            <a:r>
-              <a:rPr lang="en-US" dirty="0"/>
-              <a:t> </a:t>
-            </a:r>
-            <a:r>
-              <a:rPr lang="en-US" dirty="0" err="1"/>
-              <a:t>posibles</a:t>
-            </a:r>
-            <a:r>
-              <a:rPr lang="en-US" dirty="0"/>
-              <a:t> </a:t>
-            </a:r>
-            <a:r>
-              <a:rPr lang="en-US" dirty="0" err="1"/>
-              <a:t>valores</a:t>
-            </a:r>
-            <a:r>
-              <a:rPr lang="en-US" dirty="0"/>
-              <a:t> de la </a:t>
-            </a:r>
-            <a:r>
-              <a:rPr lang="en-US" dirty="0" err="1"/>
-              <a:t>función</a:t>
-            </a:r>
-            <a:r>
-              <a:rPr lang="en-US" dirty="0"/>
-              <a:t>, es </a:t>
-            </a:r>
-            <a:r>
-              <a:rPr lang="en-US" dirty="0" err="1"/>
-              <a:t>decir</a:t>
-            </a:r>
-            <a:r>
-              <a:rPr lang="en-US" dirty="0"/>
-              <a:t> que </a:t>
-            </a:r>
-            <a:r>
-              <a:rPr lang="en-US" dirty="0" err="1"/>
-              <a:t>los</a:t>
-            </a:r>
-            <a:r>
-              <a:rPr lang="en-US" dirty="0"/>
-              <a:t> </a:t>
-            </a:r>
-            <a:r>
-              <a:rPr lang="en-US" dirty="0" err="1"/>
-              <a:t>primeros</a:t>
-            </a:r>
-            <a:r>
-              <a:rPr lang="en-US" dirty="0"/>
-              <a:t> </a:t>
-            </a:r>
-            <a:r>
-              <a:rPr lang="en-US" dirty="0" err="1"/>
-              <a:t>tienen</a:t>
-            </a:r>
-            <a:r>
-              <a:rPr lang="en-US" dirty="0"/>
-              <a:t> </a:t>
-            </a:r>
-            <a:r>
-              <a:rPr lang="en-US" dirty="0" err="1"/>
-              <a:t>ordenes</a:t>
-            </a:r>
-            <a:r>
-              <a:rPr lang="en-US" dirty="0"/>
-              <a:t> de </a:t>
-            </a:r>
-            <a:r>
-              <a:rPr lang="en-US" dirty="0" err="1"/>
-              <a:t>magnitud</a:t>
-            </a:r>
-            <a:r>
-              <a:rPr lang="en-US" dirty="0"/>
-              <a:t> </a:t>
-            </a:r>
-            <a:r>
-              <a:rPr lang="en-US" dirty="0" err="1"/>
-              <a:t>diferentes</a:t>
-            </a:r>
-            <a:r>
-              <a:rPr lang="en-US" dirty="0"/>
-              <a:t>.</a:t>
+              <a:rPr lang="es-MX" dirty="0"/>
+              <a:t> y máximos, puesto que tienen una diferencia de varios ordenes de magnitud diferente. Esta medida NO es relevante para la tendencia central.</a:t>
+            </a:r>
+          </a:p>
+          <a:p>
+            <a:r>
+              <a:rPr lang="es-MX" dirty="0"/>
+              <a:t>Moda: El valor que más se repite, en este caso probablemente por un estimado numérico de operaciones vs monedas. </a:t>
+            </a:r>
+          </a:p>
+          <a:p>
+            <a:r>
+              <a:rPr lang="es-MX" dirty="0"/>
+              <a:t>Mediana: Nos permite aproximar el valor del punto medio si los valores no hubieran sido ordenados. Este es el valor más optimo para la tendencia central puesto que el comportamiento esta muy sesgado.</a:t>
+            </a:r>
+          </a:p>
+          <a:p>
+            <a:r>
+              <a:rPr lang="es-MX" dirty="0"/>
+              <a:t>Varianza: La varianza es alta, puesto que en este rango la función se comporta de manera sesgada. Este valor  no tiene tanta utilidad puesto</a:t>
+            </a:r>
+          </a:p>
+          <a:p>
+            <a:r>
+              <a:rPr lang="es-MX" dirty="0"/>
+              <a:t>Rango: El rango cubre esencialmente todos los posibles valores de la función, es decir que los primeros tienen ordenes de magnitud diferentes. Este valor nos permite determinar</a:t>
             </a:r>
           </a:p>
         </p:txBody>
@@ -4524,6 +4172,291 @@
     <p:extLst>
       <p:ext uri="{BB962C8B-B14F-4D97-AF65-F5344CB8AC3E}">
         <p14:creationId xmlns:p14="http://schemas.microsoft.com/office/powerpoint/2010/main" val="4181474927"/>
+      </p:ext>
+    </p:extLst>
+  </p:cSld>
+  <p:clrMapOvr>
+    <a:masterClrMapping/>
+  </p:clrMapOvr>
+</p:sld>
+</file>
+
+<file path=ppt/slides/slide6.xml><?xml version="1.0" encoding="utf-8"?>
+<p:sld xmlns:a="http://schemas.openxmlformats.org/drawingml/2006/main" xmlns:r="http://schemas.openxmlformats.org/officeDocument/2006/relationships" xmlns:p="http://schemas.openxmlformats.org/presentationml/2006/main">
+  <p:cSld>
+    <p:spTree>
+      <p:nvGrpSpPr>
+        <p:cNvPr id="1" name=""/>
+        <p:cNvGrpSpPr/>
+        <p:nvPr/>
+      </p:nvGrpSpPr>
+      <p:grpSpPr>
+        <a:xfrm>
+          <a:off x="0" y="0"/>
+          <a:ext cx="0" cy="0"/>
+          <a:chOff x="0" y="0"/>
+          <a:chExt cx="0" cy="0"/>
+        </a:xfrm>
+      </p:grpSpPr>
+      <p:sp>
+        <p:nvSpPr>
+          <p:cNvPr id="2" name="Title 1">
+            <a:extLst>
+              <a:ext uri="{FF2B5EF4-FFF2-40B4-BE49-F238E27FC236}">
+                <a16:creationId xmlns:a16="http://schemas.microsoft.com/office/drawing/2014/main" id="{1A9C5903-F2DF-D4E6-5506-64066D99387B}"/>
+              </a:ext>
+            </a:extLst>
+          </p:cNvPr>
+          <p:cNvSpPr>
+            <a:spLocks noGrp="1"/>
+          </p:cNvSpPr>
+          <p:nvPr>
+            <p:ph type="title"/>
+          </p:nvPr>
+        </p:nvSpPr>
+        <p:spPr/>
+        <p:txBody>
+          <a:bodyPr/>
+          <a:lstStyle/>
+          <a:p>
+            <a:r>
+              <a:rPr lang="en-US" dirty="0" err="1"/>
+              <a:t>Observaciones</a:t>
+            </a:r>
+            <a:r>
+              <a:rPr lang="en-US" dirty="0"/>
+              <a:t> </a:t>
+            </a:r>
+            <a:r>
+              <a:rPr lang="en-GB" b="0" dirty="0">
+                <a:solidFill>
+                  <a:srgbClr val="CE9178"/>
+                </a:solidFill>
+                <a:effectLst/>
+                <a:latin typeface="Consolas" panose="020B0609020204030204" pitchFamily="49" charset="0"/>
+              </a:rPr>
+              <a:t>BTCOAL_MAX</a:t>
+            </a:r>
+            <a:r>
+              <a:rPr lang="en-US" dirty="0"/>
+              <a:t>:</a:t>
+            </a:r>
+            <a:br>
+              <a:rPr lang="en-US" dirty="0"/>
+            </a:br>
+            <a:endParaRPr lang="en-GB" dirty="0"/>
+          </a:p>
+        </p:txBody>
+      </p:sp>
+      <p:sp>
+        <p:nvSpPr>
+          <p:cNvPr id="3" name="Content Placeholder 2">
+            <a:extLst>
+              <a:ext uri="{FF2B5EF4-FFF2-40B4-BE49-F238E27FC236}">
+                <a16:creationId xmlns:a16="http://schemas.microsoft.com/office/drawing/2014/main" id="{2329FE60-B3FE-18F0-54EB-993C0D2EC0B8}"/>
+              </a:ext>
+            </a:extLst>
+          </p:cNvPr>
+          <p:cNvSpPr>
+            <a:spLocks noGrp="1"/>
+          </p:cNvSpPr>
+          <p:nvPr>
+            <p:ph idx="1"/>
+          </p:nvPr>
+        </p:nvSpPr>
+        <p:spPr>
+          <a:xfrm>
+            <a:off x="1261872" y="1828800"/>
+            <a:ext cx="8595360" cy="4794250"/>
+          </a:xfrm>
+        </p:spPr>
+        <p:txBody>
+          <a:bodyPr>
+            <a:normAutofit/>
+          </a:bodyPr>
+          <a:lstStyle/>
+          <a:p>
+            <a:pPr marL="0" indent="0">
+              <a:buNone/>
+            </a:pPr>
+            <a:r>
+              <a:rPr lang="es-419" dirty="0"/>
+              <a:t>Se decidió comparar el comportamiento de BTCCOAL_MAX para poder agregar una métrica que nos permita determinar si el incremento en consumo sirvió como incentivo para modernizar la infraestructura y/o no depender en el carbón como fuente de energía.</a:t>
+            </a:r>
+          </a:p>
+          <a:p>
+            <a:pPr marL="0" indent="0">
+              <a:buNone/>
+            </a:pPr>
+            <a:endParaRPr lang="es-419" dirty="0"/>
+          </a:p>
+        </p:txBody>
+      </p:sp>
+      <p:pic>
+        <p:nvPicPr>
+          <p:cNvPr id="4" name="Picture 3" descr="Chart, histogram, scatter chart&#10;&#10;Description automatically generated">
+            <a:extLst>
+              <a:ext uri="{FF2B5EF4-FFF2-40B4-BE49-F238E27FC236}">
+                <a16:creationId xmlns:a16="http://schemas.microsoft.com/office/drawing/2014/main" id="{7B9900E6-2953-8AC2-6BE9-EF6FA23EB995}"/>
+              </a:ext>
+            </a:extLst>
+          </p:cNvPr>
+          <p:cNvPicPr>
+            <a:picLocks noChangeAspect="1"/>
+          </p:cNvPicPr>
+          <p:nvPr/>
+        </p:nvPicPr>
+        <p:blipFill rotWithShape="1">
+          <a:blip r:embed="rId2">
+            <a:extLst>
+              <a:ext uri="{28A0092B-C50C-407E-A947-70E740481C1C}">
+                <a14:useLocalDpi xmlns:a14="http://schemas.microsoft.com/office/drawing/2010/main" val="0"/>
+              </a:ext>
+            </a:extLst>
+          </a:blip>
+          <a:srcRect l="8715" r="8171"/>
+          <a:stretch/>
+        </p:blipFill>
+        <p:spPr>
+          <a:xfrm>
+            <a:off x="470309" y="3512503"/>
+            <a:ext cx="4023760" cy="1613737"/>
+          </a:xfrm>
+          <a:prstGeom prst="rect">
+            <a:avLst/>
+          </a:prstGeom>
+        </p:spPr>
+      </p:pic>
+      <p:pic>
+        <p:nvPicPr>
+          <p:cNvPr id="5" name="Picture 4" descr="Chart, histogram, scatter chart&#10;&#10;Description automatically generated">
+            <a:extLst>
+              <a:ext uri="{FF2B5EF4-FFF2-40B4-BE49-F238E27FC236}">
+                <a16:creationId xmlns:a16="http://schemas.microsoft.com/office/drawing/2014/main" id="{8C0C0D8B-1F7B-CDEE-1255-6F4D30C4F66B}"/>
+              </a:ext>
+            </a:extLst>
+          </p:cNvPr>
+          <p:cNvPicPr>
+            <a:picLocks noChangeAspect="1"/>
+          </p:cNvPicPr>
+          <p:nvPr/>
+        </p:nvPicPr>
+        <p:blipFill rotWithShape="1">
+          <a:blip r:embed="rId3">
+            <a:extLst>
+              <a:ext uri="{28A0092B-C50C-407E-A947-70E740481C1C}">
+                <a14:useLocalDpi xmlns:a14="http://schemas.microsoft.com/office/drawing/2010/main" val="0"/>
+              </a:ext>
+            </a:extLst>
+          </a:blip>
+          <a:srcRect l="7341" r="7747"/>
+          <a:stretch/>
+        </p:blipFill>
+        <p:spPr>
+          <a:xfrm>
+            <a:off x="6388100" y="3512502"/>
+            <a:ext cx="4110739" cy="1613737"/>
+          </a:xfrm>
+          <a:prstGeom prst="rect">
+            <a:avLst/>
+          </a:prstGeom>
+        </p:spPr>
+      </p:pic>
+      <p:sp>
+        <p:nvSpPr>
+          <p:cNvPr id="6" name="TextBox 5">
+            <a:extLst>
+              <a:ext uri="{FF2B5EF4-FFF2-40B4-BE49-F238E27FC236}">
+                <a16:creationId xmlns:a16="http://schemas.microsoft.com/office/drawing/2014/main" id="{A0CBB07E-8ECC-DD1F-144C-F86DC485444B}"/>
+              </a:ext>
+            </a:extLst>
+          </p:cNvPr>
+          <p:cNvSpPr txBox="1"/>
+          <p:nvPr/>
+        </p:nvSpPr>
+        <p:spPr>
+          <a:xfrm>
+            <a:off x="702733" y="3190359"/>
+            <a:ext cx="2138727" cy="369332"/>
+          </a:xfrm>
+          <a:prstGeom prst="rect">
+            <a:avLst/>
+          </a:prstGeom>
+          <a:noFill/>
+        </p:spPr>
+        <p:txBody>
+          <a:bodyPr wrap="none" rtlCol="0">
+            <a:spAutoFit/>
+          </a:bodyPr>
+          <a:lstStyle/>
+          <a:p>
+            <a:r>
+              <a:rPr lang="en-GB" dirty="0" err="1"/>
+              <a:t>Emisiones</a:t>
+            </a:r>
+            <a:r>
+              <a:rPr lang="en-GB" dirty="0"/>
+              <a:t> de CO2</a:t>
+            </a:r>
+          </a:p>
+        </p:txBody>
+      </p:sp>
+      <p:sp>
+        <p:nvSpPr>
+          <p:cNvPr id="7" name="TextBox 6">
+            <a:extLst>
+              <a:ext uri="{FF2B5EF4-FFF2-40B4-BE49-F238E27FC236}">
+                <a16:creationId xmlns:a16="http://schemas.microsoft.com/office/drawing/2014/main" id="{03BC87C0-7308-B897-5689-DBB708946C27}"/>
+              </a:ext>
+            </a:extLst>
+          </p:cNvPr>
+          <p:cNvSpPr txBox="1"/>
+          <p:nvPr/>
+        </p:nvSpPr>
+        <p:spPr>
+          <a:xfrm>
+            <a:off x="6561666" y="3074431"/>
+            <a:ext cx="3443571" cy="369332"/>
+          </a:xfrm>
+          <a:prstGeom prst="rect">
+            <a:avLst/>
+          </a:prstGeom>
+          <a:noFill/>
+        </p:spPr>
+        <p:txBody>
+          <a:bodyPr wrap="none" rtlCol="0">
+            <a:spAutoFit/>
+          </a:bodyPr>
+          <a:lstStyle/>
+          <a:p>
+            <a:r>
+              <a:rPr lang="en-GB" dirty="0" err="1"/>
+              <a:t>Emisiones</a:t>
+            </a:r>
+            <a:r>
+              <a:rPr lang="en-GB" dirty="0"/>
+              <a:t> de CO2 </a:t>
+            </a:r>
+            <a:r>
+              <a:rPr lang="en-GB" dirty="0" err="1"/>
+              <a:t>por</a:t>
+            </a:r>
+            <a:r>
+              <a:rPr lang="en-GB" dirty="0"/>
+              <a:t> </a:t>
+            </a:r>
+            <a:r>
+              <a:rPr lang="en-GB" dirty="0" err="1"/>
+              <a:t>carbón</a:t>
+            </a:r>
+            <a:endParaRPr lang="en-GB" dirty="0"/>
+          </a:p>
+        </p:txBody>
+      </p:sp>
+    </p:spTree>
+    <p:extLst>
+      <p:ext uri="{BB962C8B-B14F-4D97-AF65-F5344CB8AC3E}">
+        <p14:creationId xmlns:p14="http://schemas.microsoft.com/office/powerpoint/2010/main" val="403015380"/>
       </p:ext>
     </p:extLst>
   </p:cSld>

</xml_diff>

<commit_message>
add last comments on previous exposition
Signed-off-by: NicolasB <nicolasbecma1999@outlook.com>
</commit_message>
<xml_diff>
--- a/BTC C02 emissions.pptx
+++ b/BTC C02 emissions.pptx
@@ -285,7 +285,7 @@
           <a:p>
             <a:fld id="{2F4C9470-4500-4EEF-AB7C-7647D092420E}" type="datetimeFigureOut">
               <a:rPr lang="en-GB" smtClean="0"/>
-              <a:t>03/03/2023</a:t>
+              <a:t>05/03/2023</a:t>
             </a:fld>
             <a:endParaRPr lang="en-GB"/>
           </a:p>
@@ -513,7 +513,7 @@
           <a:p>
             <a:fld id="{2F4C9470-4500-4EEF-AB7C-7647D092420E}" type="datetimeFigureOut">
               <a:rPr lang="en-GB" smtClean="0"/>
-              <a:t>03/03/2023</a:t>
+              <a:t>05/03/2023</a:t>
             </a:fld>
             <a:endParaRPr lang="en-GB"/>
           </a:p>
@@ -693,7 +693,7 @@
           <a:p>
             <a:fld id="{2F4C9470-4500-4EEF-AB7C-7647D092420E}" type="datetimeFigureOut">
               <a:rPr lang="en-GB" smtClean="0"/>
-              <a:t>03/03/2023</a:t>
+              <a:t>05/03/2023</a:t>
             </a:fld>
             <a:endParaRPr lang="en-GB"/>
           </a:p>
@@ -863,7 +863,7 @@
           <a:p>
             <a:fld id="{2F4C9470-4500-4EEF-AB7C-7647D092420E}" type="datetimeFigureOut">
               <a:rPr lang="en-GB" smtClean="0"/>
-              <a:t>03/03/2023</a:t>
+              <a:t>05/03/2023</a:t>
             </a:fld>
             <a:endParaRPr lang="en-GB"/>
           </a:p>
@@ -1117,7 +1117,7 @@
           <a:p>
             <a:fld id="{2F4C9470-4500-4EEF-AB7C-7647D092420E}" type="datetimeFigureOut">
               <a:rPr lang="en-GB" smtClean="0"/>
-              <a:t>03/03/2023</a:t>
+              <a:t>05/03/2023</a:t>
             </a:fld>
             <a:endParaRPr lang="en-GB"/>
           </a:p>
@@ -1443,7 +1443,7 @@
           <a:p>
             <a:fld id="{2F4C9470-4500-4EEF-AB7C-7647D092420E}" type="datetimeFigureOut">
               <a:rPr lang="en-GB" smtClean="0"/>
-              <a:t>03/03/2023</a:t>
+              <a:t>05/03/2023</a:t>
             </a:fld>
             <a:endParaRPr lang="en-GB"/>
           </a:p>
@@ -1894,7 +1894,7 @@
           <a:p>
             <a:fld id="{2F4C9470-4500-4EEF-AB7C-7647D092420E}" type="datetimeFigureOut">
               <a:rPr lang="en-GB" smtClean="0"/>
-              <a:t>03/03/2023</a:t>
+              <a:t>05/03/2023</a:t>
             </a:fld>
             <a:endParaRPr lang="en-GB"/>
           </a:p>
@@ -2012,7 +2012,7 @@
           <a:p>
             <a:fld id="{2F4C9470-4500-4EEF-AB7C-7647D092420E}" type="datetimeFigureOut">
               <a:rPr lang="en-GB" smtClean="0"/>
-              <a:t>03/03/2023</a:t>
+              <a:t>05/03/2023</a:t>
             </a:fld>
             <a:endParaRPr lang="en-GB"/>
           </a:p>
@@ -2107,7 +2107,7 @@
           <a:p>
             <a:fld id="{2F4C9470-4500-4EEF-AB7C-7647D092420E}" type="datetimeFigureOut">
               <a:rPr lang="en-GB" smtClean="0"/>
-              <a:t>03/03/2023</a:t>
+              <a:t>05/03/2023</a:t>
             </a:fld>
             <a:endParaRPr lang="en-GB"/>
           </a:p>
@@ -2394,7 +2394,7 @@
           <a:p>
             <a:fld id="{2F4C9470-4500-4EEF-AB7C-7647D092420E}" type="datetimeFigureOut">
               <a:rPr lang="en-GB" smtClean="0"/>
-              <a:t>03/03/2023</a:t>
+              <a:t>05/03/2023</a:t>
             </a:fld>
             <a:endParaRPr lang="en-GB"/>
           </a:p>
@@ -2716,7 +2716,7 @@
           <a:p>
             <a:fld id="{2F4C9470-4500-4EEF-AB7C-7647D092420E}" type="datetimeFigureOut">
               <a:rPr lang="en-GB" smtClean="0"/>
-              <a:t>03/03/2023</a:t>
+              <a:t>05/03/2023</a:t>
             </a:fld>
             <a:endParaRPr lang="en-GB"/>
           </a:p>
@@ -2970,7 +2970,7 @@
           <a:p>
             <a:fld id="{2F4C9470-4500-4EEF-AB7C-7647D092420E}" type="datetimeFigureOut">
               <a:rPr lang="en-GB" smtClean="0"/>
-              <a:t>03/03/2023</a:t>
+              <a:t>05/03/2023</a:t>
             </a:fld>
             <a:endParaRPr lang="en-GB"/>
           </a:p>
@@ -3559,7 +3559,7 @@
         <p:spPr>
           <a:xfrm>
             <a:off x="577272" y="1777484"/>
-            <a:ext cx="6097248" cy="646331"/>
+            <a:ext cx="6097248" cy="1477328"/>
           </a:xfrm>
           <a:prstGeom prst="rect">
             <a:avLst/>
@@ -3579,6 +3579,108 @@
               <a:t>Dataset on bitcoin carbon footprint and energy consumption (figshare.com)</a:t>
             </a:r>
             <a:endParaRPr lang="en-GB" dirty="0"/>
+          </a:p>
+          <a:p>
+            <a:r>
+              <a:rPr lang="en-GB" dirty="0"/>
+              <a:t>Los datos </a:t>
+            </a:r>
+            <a:r>
+              <a:rPr lang="en-GB" dirty="0" err="1"/>
+              <a:t>comparan</a:t>
+            </a:r>
+            <a:r>
+              <a:rPr lang="en-GB" dirty="0"/>
+              <a:t> </a:t>
+            </a:r>
+            <a:r>
+              <a:rPr lang="en-GB" dirty="0" err="1"/>
+              <a:t>el</a:t>
+            </a:r>
+            <a:r>
+              <a:rPr lang="en-GB" dirty="0"/>
+              <a:t> consume de </a:t>
+            </a:r>
+            <a:r>
+              <a:rPr lang="en-GB" dirty="0" err="1"/>
+              <a:t>electricidad</a:t>
+            </a:r>
+            <a:r>
+              <a:rPr lang="en-GB" dirty="0"/>
+              <a:t> de la </a:t>
+            </a:r>
+            <a:r>
+              <a:rPr lang="en-GB" dirty="0" err="1"/>
+              <a:t>tecnología</a:t>
+            </a:r>
+            <a:r>
+              <a:rPr lang="en-GB" dirty="0"/>
+              <a:t> BTC con la </a:t>
+            </a:r>
+            <a:r>
+              <a:rPr lang="en-GB" dirty="0" err="1"/>
+              <a:t>producción</a:t>
+            </a:r>
+            <a:r>
+              <a:rPr lang="en-GB" dirty="0"/>
+              <a:t> de </a:t>
+            </a:r>
+            <a:r>
+              <a:rPr lang="en-GB" dirty="0" err="1"/>
+              <a:t>dioxido</a:t>
+            </a:r>
+            <a:r>
+              <a:rPr lang="en-GB" dirty="0"/>
+              <a:t> de </a:t>
+            </a:r>
+            <a:r>
+              <a:rPr lang="en-GB" dirty="0" err="1"/>
+              <a:t>carbono</a:t>
+            </a:r>
+            <a:r>
+              <a:rPr lang="en-GB" dirty="0"/>
+              <a:t> </a:t>
+            </a:r>
+            <a:r>
+              <a:rPr lang="en-GB" dirty="0" err="1"/>
+              <a:t>por</a:t>
+            </a:r>
+            <a:r>
+              <a:rPr lang="en-GB" dirty="0"/>
+              <a:t> </a:t>
+            </a:r>
+            <a:r>
+              <a:rPr lang="en-GB" dirty="0" err="1"/>
+              <a:t>cada</a:t>
+            </a:r>
+            <a:r>
+              <a:rPr lang="en-GB" dirty="0"/>
+              <a:t> </a:t>
+            </a:r>
+            <a:r>
+              <a:rPr lang="en-GB" dirty="0" err="1"/>
+              <a:t>una</a:t>
+            </a:r>
+            <a:r>
+              <a:rPr lang="en-GB" dirty="0"/>
+              <a:t> de las </a:t>
+            </a:r>
+            <a:r>
+              <a:rPr lang="en-GB" dirty="0" err="1"/>
+              <a:t>fuentes</a:t>
+            </a:r>
+            <a:r>
+              <a:rPr lang="en-GB" dirty="0"/>
+              <a:t> de combustible </a:t>
+            </a:r>
+            <a:r>
+              <a:rPr lang="en-GB" dirty="0" err="1"/>
+              <a:t>fosiles</a:t>
+            </a:r>
+            <a:r>
+              <a:rPr lang="en-GB" dirty="0"/>
+              <a:t>.</a:t>
+            </a:r>
           </a:p>
         </p:txBody>
       </p:sp>
@@ -3885,6 +3987,41 @@
           <a:chExt cx="0" cy="0"/>
         </a:xfrm>
       </p:grpSpPr>
+      <p:pic>
+        <p:nvPicPr>
+          <p:cNvPr id="7" name="Picture 6" descr="Chart, scatter chart&#10;&#10;Description automatically generated">
+            <a:extLst>
+              <a:ext uri="{FF2B5EF4-FFF2-40B4-BE49-F238E27FC236}">
+                <a16:creationId xmlns:a16="http://schemas.microsoft.com/office/drawing/2014/main" id="{5766A08E-7247-7D77-BEFD-A5A4BFF63A8A}"/>
+              </a:ext>
+            </a:extLst>
+          </p:cNvPr>
+          <p:cNvPicPr>
+            <a:picLocks noChangeAspect="1"/>
+          </p:cNvPicPr>
+          <p:nvPr/>
+        </p:nvPicPr>
+        <p:blipFill rotWithShape="1">
+          <a:blip r:embed="rId2">
+            <a:extLst>
+              <a:ext uri="{28A0092B-C50C-407E-A947-70E740481C1C}">
+                <a14:useLocalDpi xmlns:a14="http://schemas.microsoft.com/office/drawing/2010/main" val="0"/>
+              </a:ext>
+            </a:extLst>
+          </a:blip>
+          <a:srcRect l="9362" r="8557"/>
+          <a:stretch/>
+        </p:blipFill>
+        <p:spPr>
+          <a:xfrm>
+            <a:off x="736540" y="2855976"/>
+            <a:ext cx="9854730" cy="4002024"/>
+          </a:xfrm>
+          <a:prstGeom prst="rect">
+            <a:avLst/>
+          </a:prstGeom>
+        </p:spPr>
+      </p:pic>
       <p:sp>
         <p:nvSpPr>
           <p:cNvPr id="2" name="Title 1">
@@ -3927,7 +4064,7 @@
                 <a:effectLst/>
                 <a:latin typeface="Consolas" panose="020B0609020204030204" pitchFamily="49" charset="0"/>
               </a:rPr>
-              <a:t>BTCOAL_MAX</a:t>
+              <a:t>BTCGAS_GUE</a:t>
             </a:r>
             <a:endParaRPr lang="en-GB" dirty="0"/>
           </a:p>
@@ -3935,10 +4072,10 @@
       </p:sp>
       <p:pic>
         <p:nvPicPr>
-          <p:cNvPr id="6" name="Picture 5">
+          <p:cNvPr id="4" name="Picture 3">
             <a:extLst>
               <a:ext uri="{FF2B5EF4-FFF2-40B4-BE49-F238E27FC236}">
-                <a16:creationId xmlns:a16="http://schemas.microsoft.com/office/drawing/2014/main" id="{8167FF20-5E72-D377-A3E6-980DA8340E0E}"/>
+                <a16:creationId xmlns:a16="http://schemas.microsoft.com/office/drawing/2014/main" id="{C178FEFE-73B8-F60C-B481-EA773A71872E}"/>
               </a:ext>
             </a:extLst>
           </p:cNvPr>
@@ -3948,50 +4085,15 @@
           <p:nvPr/>
         </p:nvPicPr>
         <p:blipFill>
-          <a:blip r:embed="rId2"/>
+          <a:blip r:embed="rId3"/>
           <a:stretch>
             <a:fillRect/>
           </a:stretch>
         </p:blipFill>
         <p:spPr>
           <a:xfrm>
-            <a:off x="6623146" y="225456"/>
-            <a:ext cx="4534533" cy="2676899"/>
-          </a:xfrm>
-          <a:prstGeom prst="rect">
-            <a:avLst/>
-          </a:prstGeom>
-        </p:spPr>
-      </p:pic>
-      <p:pic>
-        <p:nvPicPr>
-          <p:cNvPr id="8" name="Picture 7" descr="Chart, histogram, scatter chart&#10;&#10;Description automatically generated">
-            <a:extLst>
-              <a:ext uri="{FF2B5EF4-FFF2-40B4-BE49-F238E27FC236}">
-                <a16:creationId xmlns:a16="http://schemas.microsoft.com/office/drawing/2014/main" id="{7685902D-DD56-63D6-F7BB-EBFAE6FFDEC5}"/>
-              </a:ext>
-            </a:extLst>
-          </p:cNvPr>
-          <p:cNvPicPr>
-            <a:picLocks noChangeAspect="1"/>
-          </p:cNvPicPr>
-          <p:nvPr/>
-        </p:nvPicPr>
-        <p:blipFill rotWithShape="1">
-          <a:blip r:embed="rId3">
-            <a:extLst>
-              <a:ext uri="{28A0092B-C50C-407E-A947-70E740481C1C}">
-                <a14:useLocalDpi xmlns:a14="http://schemas.microsoft.com/office/drawing/2010/main" val="0"/>
-              </a:ext>
-            </a:extLst>
-          </a:blip>
-          <a:srcRect l="7341" r="7747"/>
-          <a:stretch/>
-        </p:blipFill>
-        <p:spPr>
-          <a:xfrm>
-            <a:off x="837948" y="2970550"/>
-            <a:ext cx="9692641" cy="3805003"/>
+            <a:off x="6108192" y="265072"/>
+            <a:ext cx="4391638" cy="2705478"/>
           </a:xfrm>
           <a:prstGeom prst="rect">
             <a:avLst/>
@@ -4131,15 +4233,7 @@
           <a:p>
             <a:r>
               <a:rPr lang="es-MX" dirty="0"/>
-              <a:t>Media: La media esta muy sesgada en comparación con los valores </a:t>
-            </a:r>
-            <a:r>
-              <a:rPr lang="es-MX" dirty="0" err="1"/>
-              <a:t>minimos</a:t>
-            </a:r>
-            <a:r>
-              <a:rPr lang="es-MX" dirty="0"/>
-              <a:t> y máximos, puesto que tienen una diferencia de varios ordenes de magnitud diferente. Esta medida NO es relevante para la tendencia central.</a:t>
+              <a:t>Media: La media esta muy sesgada en comparación con los valores mínimos y máximos, puesto que tienen una diferencia de varios ordenes de magnitud diferente. Esta medida NO es relevante para la tendencia central.</a:t>
             </a:r>
           </a:p>
           <a:p>
@@ -4216,7 +4310,9 @@
         </p:nvSpPr>
         <p:spPr/>
         <p:txBody>
-          <a:bodyPr/>
+          <a:bodyPr>
+            <a:normAutofit/>
+          </a:bodyPr>
           <a:lstStyle/>
           <a:p>
             <a:r>
@@ -4235,7 +4331,7 @@
                 <a:effectLst/>
                 <a:latin typeface="Consolas" panose="020B0609020204030204" pitchFamily="49" charset="0"/>
               </a:rPr>
-              <a:t>BTCOAL_MAX</a:t>
+              <a:t>BTCGAS_GUE</a:t>
             </a:r>
             <a:r>
               <a:rPr lang="en-US" dirty="0"/>
@@ -4281,7 +4377,15 @@
             </a:pPr>
             <a:r>
               <a:rPr lang="es-419" dirty="0"/>
-              <a:t>Se decidió comparar el comportamiento de BTCCOAL_MAX para poder agregar una métrica que nos permita determinar si el incremento en consumo sirvió como incentivo para modernizar la infraestructura y/o no depender en el carbón como fuente de energía.</a:t>
+              <a:t>Se decidió comparar BTCGAS_GUE</a:t>
+            </a:r>
+            <a:r>
+              <a:rPr lang="en-GB" dirty="0"/>
+              <a:t> para </a:t>
+            </a:r>
+            <a:r>
+              <a:rPr lang="es-MX" dirty="0"/>
+              <a:t>comparar el caso optimo en el cuál aún se dependen de fuentes no renovables para soportar la tecnología del BTC y así poder contrastar si el agente que tiene mayor impacto en las emisiones de carbono es la moneda y su algoritmo o la manera en la que se produce electricidad.</a:t>
             </a:r>
           </a:p>
           <a:p>
@@ -4416,7 +4520,7 @@
         <p:spPr>
           <a:xfrm>
             <a:off x="6561666" y="3074431"/>
-            <a:ext cx="3443571" cy="369332"/>
+            <a:ext cx="4759636" cy="369332"/>
           </a:xfrm>
           <a:prstGeom prst="rect">
             <a:avLst/>
@@ -4439,7 +4543,7 @@
             </a:r>
             <a:r>
               <a:rPr lang="en-GB" dirty="0" err="1"/>
-              <a:t>por</a:t>
+              <a:t>optimas</a:t>
             </a:r>
             <a:r>
               <a:rPr lang="en-GB" dirty="0"/>
@@ -4447,9 +4551,12 @@
             </a:r>
             <a:r>
               <a:rPr lang="en-GB" dirty="0" err="1"/>
-              <a:t>carbón</a:t>
-            </a:r>
-            <a:endParaRPr lang="en-GB" dirty="0"/>
+              <a:t>por</a:t>
+            </a:r>
+            <a:r>
+              <a:rPr lang="en-GB" dirty="0"/>
+              <a:t> gas natural</a:t>
+            </a:r>
           </a:p>
         </p:txBody>
       </p:sp>

</xml_diff>